<commit_message>
HelloWorld.c v1.0 using using <<printf()>> function.
</commit_message>
<xml_diff>
--- a/HelloWorld executions.pptx
+++ b/HelloWorld executions.pptx
@@ -8,6 +8,8 @@
     <p:sldId id="256" r:id="rId2"/>
     <p:sldId id="258" r:id="rId3"/>
     <p:sldId id="257" r:id="rId4"/>
+    <p:sldId id="259" r:id="rId5"/>
+    <p:sldId id="260" r:id="rId6"/>
   </p:sldIdLst>
   <p:sldSz cx="9144000" cy="6858000" type="screen4x3"/>
   <p:notesSz cx="6858000" cy="9144000"/>
@@ -3382,6 +3384,282 @@
     <p:extLst>
       <p:ext uri="{BB962C8B-B14F-4D97-AF65-F5344CB8AC3E}">
         <p14:creationId xmlns:p14="http://schemas.microsoft.com/office/powerpoint/2010/main" val="340215930"/>
+      </p:ext>
+    </p:extLst>
+  </p:cSld>
+  <p:clrMapOvr>
+    <a:masterClrMapping/>
+  </p:clrMapOvr>
+</p:sld>
+</file>
+
+<file path=ppt/slides/slide4.xml><?xml version="1.0" encoding="utf-8"?>
+<p:sld xmlns:a="http://schemas.openxmlformats.org/drawingml/2006/main" xmlns:r="http://schemas.openxmlformats.org/officeDocument/2006/relationships" xmlns:p="http://schemas.openxmlformats.org/presentationml/2006/main">
+  <p:cSld>
+    <p:spTree>
+      <p:nvGrpSpPr>
+        <p:cNvPr id="1" name=""/>
+        <p:cNvGrpSpPr/>
+        <p:nvPr/>
+      </p:nvGrpSpPr>
+      <p:grpSpPr>
+        <a:xfrm>
+          <a:off x="0" y="0"/>
+          <a:ext cx="0" cy="0"/>
+          <a:chOff x="0" y="0"/>
+          <a:chExt cx="0" cy="0"/>
+        </a:xfrm>
+      </p:grpSpPr>
+      <p:sp>
+        <p:nvSpPr>
+          <p:cNvPr id="2" name="1 Título"/>
+          <p:cNvSpPr>
+            <a:spLocks noGrp="1"/>
+          </p:cNvSpPr>
+          <p:nvPr>
+            <p:ph type="title"/>
+          </p:nvPr>
+        </p:nvSpPr>
+        <p:spPr/>
+        <p:txBody>
+          <a:bodyPr/>
+          <a:lstStyle/>
+          <a:p>
+            <a:r>
+              <a:rPr lang="es-MX" dirty="0" smtClean="0"/>
+              <a:t>HelloWorld.exe v1.0</a:t>
+            </a:r>
+            <a:endParaRPr lang="es-MX" dirty="0"/>
+          </a:p>
+        </p:txBody>
+      </p:sp>
+      <p:sp>
+        <p:nvSpPr>
+          <p:cNvPr id="3" name="2 Marcador de contenido"/>
+          <p:cNvSpPr>
+            <a:spLocks noGrp="1"/>
+          </p:cNvSpPr>
+          <p:nvPr>
+            <p:ph idx="1"/>
+          </p:nvPr>
+        </p:nvSpPr>
+        <p:spPr/>
+        <p:txBody>
+          <a:bodyPr/>
+          <a:lstStyle/>
+          <a:p>
+            <a:endParaRPr lang="es-MX" dirty="0"/>
+          </a:p>
+        </p:txBody>
+      </p:sp>
+      <p:pic>
+        <p:nvPicPr>
+          <p:cNvPr id="2050" name="Picture 2"/>
+          <p:cNvPicPr>
+            <a:picLocks noChangeAspect="1" noChangeArrowheads="1"/>
+          </p:cNvPicPr>
+          <p:nvPr/>
+        </p:nvPicPr>
+        <p:blipFill>
+          <a:blip r:embed="rId2">
+            <a:extLst>
+              <a:ext uri="{28A0092B-C50C-407E-A947-70E740481C1C}">
+                <a14:useLocalDpi xmlns:a14="http://schemas.microsoft.com/office/drawing/2010/main" val="0"/>
+              </a:ext>
+            </a:extLst>
+          </a:blip>
+          <a:srcRect/>
+          <a:stretch>
+            <a:fillRect/>
+          </a:stretch>
+        </p:blipFill>
+        <p:spPr bwMode="auto">
+          <a:xfrm>
+            <a:off x="539552" y="1628800"/>
+            <a:ext cx="8141300" cy="4392488"/>
+          </a:xfrm>
+          <a:prstGeom prst="rect">
+            <a:avLst/>
+          </a:prstGeom>
+          <a:noFill/>
+          <a:ln>
+            <a:noFill/>
+          </a:ln>
+          <a:effectLst/>
+          <a:extLst>
+            <a:ext uri="{909E8E84-426E-40DD-AFC4-6F175D3DCCD1}">
+              <a14:hiddenFill xmlns:a14="http://schemas.microsoft.com/office/drawing/2010/main">
+                <a:solidFill>
+                  <a:schemeClr val="accent1"/>
+                </a:solidFill>
+              </a14:hiddenFill>
+            </a:ext>
+            <a:ext uri="{91240B29-F687-4F45-9708-019B960494DF}">
+              <a14:hiddenLine xmlns:a14="http://schemas.microsoft.com/office/drawing/2010/main" w="9525">
+                <a:solidFill>
+                  <a:schemeClr val="tx1"/>
+                </a:solidFill>
+                <a:miter lim="800000"/>
+                <a:headEnd/>
+                <a:tailEnd/>
+              </a14:hiddenLine>
+            </a:ext>
+            <a:ext uri="{AF507438-7753-43E0-B8FC-AC1667EBCBE1}">
+              <a14:hiddenEffects xmlns:a14="http://schemas.microsoft.com/office/drawing/2010/main">
+                <a:effectLst>
+                  <a:outerShdw dist="35921" dir="2700000" algn="ctr" rotWithShape="0">
+                    <a:schemeClr val="bg2"/>
+                  </a:outerShdw>
+                </a:effectLst>
+              </a14:hiddenEffects>
+            </a:ext>
+          </a:extLst>
+        </p:spPr>
+      </p:pic>
+    </p:spTree>
+    <p:extLst>
+      <p:ext uri="{BB962C8B-B14F-4D97-AF65-F5344CB8AC3E}">
+        <p14:creationId xmlns:p14="http://schemas.microsoft.com/office/powerpoint/2010/main" val="576518659"/>
+      </p:ext>
+    </p:extLst>
+  </p:cSld>
+  <p:clrMapOvr>
+    <a:masterClrMapping/>
+  </p:clrMapOvr>
+</p:sld>
+</file>
+
+<file path=ppt/slides/slide5.xml><?xml version="1.0" encoding="utf-8"?>
+<p:sld xmlns:a="http://schemas.openxmlformats.org/drawingml/2006/main" xmlns:r="http://schemas.openxmlformats.org/officeDocument/2006/relationships" xmlns:p="http://schemas.openxmlformats.org/presentationml/2006/main">
+  <p:cSld>
+    <p:spTree>
+      <p:nvGrpSpPr>
+        <p:cNvPr id="1" name=""/>
+        <p:cNvGrpSpPr/>
+        <p:nvPr/>
+      </p:nvGrpSpPr>
+      <p:grpSpPr>
+        <a:xfrm>
+          <a:off x="0" y="0"/>
+          <a:ext cx="0" cy="0"/>
+          <a:chOff x="0" y="0"/>
+          <a:chExt cx="0" cy="0"/>
+        </a:xfrm>
+      </p:grpSpPr>
+      <p:sp>
+        <p:nvSpPr>
+          <p:cNvPr id="2" name="1 Título"/>
+          <p:cNvSpPr>
+            <a:spLocks noGrp="1"/>
+          </p:cNvSpPr>
+          <p:nvPr>
+            <p:ph type="title"/>
+          </p:nvPr>
+        </p:nvSpPr>
+        <p:spPr/>
+        <p:txBody>
+          <a:bodyPr/>
+          <a:lstStyle/>
+          <a:p>
+            <a:r>
+              <a:rPr lang="es-MX" dirty="0" err="1" smtClean="0"/>
+              <a:t>Execution</a:t>
+            </a:r>
+            <a:r>
+              <a:rPr lang="es-MX" dirty="0" smtClean="0"/>
+              <a:t> of v1.0</a:t>
+            </a:r>
+            <a:endParaRPr lang="es-MX" dirty="0"/>
+          </a:p>
+        </p:txBody>
+      </p:sp>
+      <p:sp>
+        <p:nvSpPr>
+          <p:cNvPr id="3" name="2 Marcador de contenido"/>
+          <p:cNvSpPr>
+            <a:spLocks noGrp="1"/>
+          </p:cNvSpPr>
+          <p:nvPr>
+            <p:ph idx="1"/>
+          </p:nvPr>
+        </p:nvSpPr>
+        <p:spPr/>
+        <p:txBody>
+          <a:bodyPr/>
+          <a:lstStyle/>
+          <a:p>
+            <a:endParaRPr lang="es-MX" dirty="0"/>
+          </a:p>
+        </p:txBody>
+      </p:sp>
+      <p:pic>
+        <p:nvPicPr>
+          <p:cNvPr id="1026" name="Picture 2"/>
+          <p:cNvPicPr>
+            <a:picLocks noChangeAspect="1" noChangeArrowheads="1"/>
+          </p:cNvPicPr>
+          <p:nvPr/>
+        </p:nvPicPr>
+        <p:blipFill>
+          <a:blip r:embed="rId2">
+            <a:extLst>
+              <a:ext uri="{28A0092B-C50C-407E-A947-70E740481C1C}">
+                <a14:useLocalDpi xmlns:a14="http://schemas.microsoft.com/office/drawing/2010/main" val="0"/>
+              </a:ext>
+            </a:extLst>
+          </a:blip>
+          <a:srcRect/>
+          <a:stretch>
+            <a:fillRect/>
+          </a:stretch>
+        </p:blipFill>
+        <p:spPr bwMode="auto">
+          <a:xfrm>
+            <a:off x="539552" y="1700808"/>
+            <a:ext cx="8136904" cy="4255460"/>
+          </a:xfrm>
+          <a:prstGeom prst="rect">
+            <a:avLst/>
+          </a:prstGeom>
+          <a:noFill/>
+          <a:ln>
+            <a:noFill/>
+          </a:ln>
+          <a:effectLst/>
+          <a:extLst>
+            <a:ext uri="{909E8E84-426E-40DD-AFC4-6F175D3DCCD1}">
+              <a14:hiddenFill xmlns:a14="http://schemas.microsoft.com/office/drawing/2010/main">
+                <a:solidFill>
+                  <a:schemeClr val="accent1"/>
+                </a:solidFill>
+              </a14:hiddenFill>
+            </a:ext>
+            <a:ext uri="{91240B29-F687-4F45-9708-019B960494DF}">
+              <a14:hiddenLine xmlns:a14="http://schemas.microsoft.com/office/drawing/2010/main" w="9525">
+                <a:solidFill>
+                  <a:schemeClr val="tx1"/>
+                </a:solidFill>
+                <a:miter lim="800000"/>
+                <a:headEnd/>
+                <a:tailEnd/>
+              </a14:hiddenLine>
+            </a:ext>
+            <a:ext uri="{AF507438-7753-43E0-B8FC-AC1667EBCBE1}">
+              <a14:hiddenEffects xmlns:a14="http://schemas.microsoft.com/office/drawing/2010/main">
+                <a:effectLst>
+                  <a:outerShdw dist="35921" dir="2700000" algn="ctr" rotWithShape="0">
+                    <a:schemeClr val="bg2"/>
+                  </a:outerShdw>
+                </a:effectLst>
+              </a14:hiddenEffects>
+            </a:ext>
+          </a:extLst>
+        </p:spPr>
+      </p:pic>
+    </p:spTree>
+    <p:extLst>
+      <p:ext uri="{BB962C8B-B14F-4D97-AF65-F5344CB8AC3E}">
+        <p14:creationId xmlns:p14="http://schemas.microsoft.com/office/powerpoint/2010/main" val="3093135577"/>
       </p:ext>
     </p:extLst>
   </p:cSld>

</xml_diff>